<commit_message>
Update to panel sticker
</commit_message>
<xml_diff>
--- a/label2.pptx
+++ b/label2.pptx
@@ -106,7 +106,7 @@
   </p:defaultTextStyle>
   <p:extLst>
     <p:ext uri="{EFAFB233-063F-42B5-8137-9DF3F51BA10A}">
-      <p15:sldGuideLst xmlns:p15="http://schemas.microsoft.com/office/powerpoint/2012/main"/>
+      <p15:sldGuideLst xmlns:p15="http://schemas.microsoft.com/office/powerpoint/2012/main" xmlns=""/>
     </p:ext>
   </p:extLst>
 </p:presentation>
@@ -243,7 +243,7 @@
           <a:p>
             <a:fld id="{D43D9AAC-9071-43ED-8F46-95CD8F5812BB}" type="datetimeFigureOut">
               <a:rPr lang="en-GB" smtClean="0"/>
-              <a:t>16/06/2016</a:t>
+              <a:t>17/06/2016</a:t>
             </a:fld>
             <a:endParaRPr lang="en-GB"/>
           </a:p>
@@ -413,7 +413,7 @@
           <a:p>
             <a:fld id="{D43D9AAC-9071-43ED-8F46-95CD8F5812BB}" type="datetimeFigureOut">
               <a:rPr lang="en-GB" smtClean="0"/>
-              <a:t>16/06/2016</a:t>
+              <a:t>17/06/2016</a:t>
             </a:fld>
             <a:endParaRPr lang="en-GB"/>
           </a:p>
@@ -593,7 +593,7 @@
           <a:p>
             <a:fld id="{D43D9AAC-9071-43ED-8F46-95CD8F5812BB}" type="datetimeFigureOut">
               <a:rPr lang="en-GB" smtClean="0"/>
-              <a:t>16/06/2016</a:t>
+              <a:t>17/06/2016</a:t>
             </a:fld>
             <a:endParaRPr lang="en-GB"/>
           </a:p>
@@ -763,7 +763,7 @@
           <a:p>
             <a:fld id="{D43D9AAC-9071-43ED-8F46-95CD8F5812BB}" type="datetimeFigureOut">
               <a:rPr lang="en-GB" smtClean="0"/>
-              <a:t>16/06/2016</a:t>
+              <a:t>17/06/2016</a:t>
             </a:fld>
             <a:endParaRPr lang="en-GB"/>
           </a:p>
@@ -1007,7 +1007,7 @@
           <a:p>
             <a:fld id="{D43D9AAC-9071-43ED-8F46-95CD8F5812BB}" type="datetimeFigureOut">
               <a:rPr lang="en-GB" smtClean="0"/>
-              <a:t>16/06/2016</a:t>
+              <a:t>17/06/2016</a:t>
             </a:fld>
             <a:endParaRPr lang="en-GB"/>
           </a:p>
@@ -1239,7 +1239,7 @@
           <a:p>
             <a:fld id="{D43D9AAC-9071-43ED-8F46-95CD8F5812BB}" type="datetimeFigureOut">
               <a:rPr lang="en-GB" smtClean="0"/>
-              <a:t>16/06/2016</a:t>
+              <a:t>17/06/2016</a:t>
             </a:fld>
             <a:endParaRPr lang="en-GB"/>
           </a:p>
@@ -1606,7 +1606,7 @@
           <a:p>
             <a:fld id="{D43D9AAC-9071-43ED-8F46-95CD8F5812BB}" type="datetimeFigureOut">
               <a:rPr lang="en-GB" smtClean="0"/>
-              <a:t>16/06/2016</a:t>
+              <a:t>17/06/2016</a:t>
             </a:fld>
             <a:endParaRPr lang="en-GB"/>
           </a:p>
@@ -1724,7 +1724,7 @@
           <a:p>
             <a:fld id="{D43D9AAC-9071-43ED-8F46-95CD8F5812BB}" type="datetimeFigureOut">
               <a:rPr lang="en-GB" smtClean="0"/>
-              <a:t>16/06/2016</a:t>
+              <a:t>17/06/2016</a:t>
             </a:fld>
             <a:endParaRPr lang="en-GB"/>
           </a:p>
@@ -1819,7 +1819,7 @@
           <a:p>
             <a:fld id="{D43D9AAC-9071-43ED-8F46-95CD8F5812BB}" type="datetimeFigureOut">
               <a:rPr lang="en-GB" smtClean="0"/>
-              <a:t>16/06/2016</a:t>
+              <a:t>17/06/2016</a:t>
             </a:fld>
             <a:endParaRPr lang="en-GB"/>
           </a:p>
@@ -2096,7 +2096,7 @@
           <a:p>
             <a:fld id="{D43D9AAC-9071-43ED-8F46-95CD8F5812BB}" type="datetimeFigureOut">
               <a:rPr lang="en-GB" smtClean="0"/>
-              <a:t>16/06/2016</a:t>
+              <a:t>17/06/2016</a:t>
             </a:fld>
             <a:endParaRPr lang="en-GB"/>
           </a:p>
@@ -2353,7 +2353,7 @@
           <a:p>
             <a:fld id="{D43D9AAC-9071-43ED-8F46-95CD8F5812BB}" type="datetimeFigureOut">
               <a:rPr lang="en-GB" smtClean="0"/>
-              <a:t>16/06/2016</a:t>
+              <a:t>17/06/2016</a:t>
             </a:fld>
             <a:endParaRPr lang="en-GB"/>
           </a:p>
@@ -2566,7 +2566,7 @@
           <a:p>
             <a:fld id="{D43D9AAC-9071-43ED-8F46-95CD8F5812BB}" type="datetimeFigureOut">
               <a:rPr lang="en-GB" smtClean="0"/>
-              <a:t>16/06/2016</a:t>
+              <a:t>17/06/2016</a:t>
             </a:fld>
             <a:endParaRPr lang="en-GB"/>
           </a:p>
@@ -2971,76 +2971,200 @@
           <a:chExt cx="0" cy="0"/>
         </a:xfrm>
       </p:grpSpPr>
+      <p:sp>
+        <p:nvSpPr>
+          <p:cNvPr id="80" name="Rectangle 79"/>
+          <p:cNvSpPr/>
+          <p:nvPr/>
+        </p:nvSpPr>
+        <p:spPr>
+          <a:xfrm>
+            <a:off x="631086" y="576264"/>
+            <a:ext cx="2717307" cy="4312260"/>
+          </a:xfrm>
+          <a:prstGeom prst="rect">
+            <a:avLst/>
+          </a:prstGeom>
+          <a:solidFill>
+            <a:schemeClr val="tx1"/>
+          </a:solidFill>
+          <a:ln>
+            <a:solidFill>
+              <a:schemeClr val="tx1"/>
+            </a:solidFill>
+          </a:ln>
+        </p:spPr>
+        <p:style>
+          <a:lnRef idx="2">
+            <a:schemeClr val="accent1">
+              <a:shade val="50000"/>
+            </a:schemeClr>
+          </a:lnRef>
+          <a:fillRef idx="1">
+            <a:schemeClr val="accent1"/>
+          </a:fillRef>
+          <a:effectRef idx="0">
+            <a:schemeClr val="accent1"/>
+          </a:effectRef>
+          <a:fontRef idx="minor">
+            <a:schemeClr val="lt1"/>
+          </a:fontRef>
+        </p:style>
+        <p:txBody>
+          <a:bodyPr rtlCol="0" anchor="ctr"/>
+          <a:lstStyle/>
+          <a:p>
+            <a:pPr algn="ctr"/>
+            <a:endParaRPr lang="en-GB" sz="1801" dirty="0"/>
+          </a:p>
+        </p:txBody>
+      </p:sp>
+      <p:sp>
+        <p:nvSpPr>
+          <p:cNvPr id="76" name="Rectangle 75"/>
+          <p:cNvSpPr/>
+          <p:nvPr/>
+        </p:nvSpPr>
+        <p:spPr>
+          <a:xfrm>
+            <a:off x="631087" y="954118"/>
+            <a:ext cx="2717306" cy="531784"/>
+          </a:xfrm>
+          <a:prstGeom prst="rect">
+            <a:avLst/>
+          </a:prstGeom>
+          <a:solidFill>
+            <a:srgbClr val="BAD80A"/>
+          </a:solidFill>
+          <a:ln>
+            <a:noFill/>
+          </a:ln>
+        </p:spPr>
+        <p:style>
+          <a:lnRef idx="2">
+            <a:schemeClr val="accent1">
+              <a:shade val="50000"/>
+            </a:schemeClr>
+          </a:lnRef>
+          <a:fillRef idx="1">
+            <a:schemeClr val="accent1"/>
+          </a:fillRef>
+          <a:effectRef idx="0">
+            <a:schemeClr val="accent1"/>
+          </a:effectRef>
+          <a:fontRef idx="minor">
+            <a:schemeClr val="lt1"/>
+          </a:fontRef>
+        </p:style>
+        <p:txBody>
+          <a:bodyPr rtlCol="0" anchor="ctr"/>
+          <a:lstStyle/>
+          <a:p>
+            <a:pPr algn="ctr"/>
+            <a:endParaRPr lang="en-GB" sz="1801"/>
+          </a:p>
+        </p:txBody>
+      </p:sp>
+      <p:sp>
+        <p:nvSpPr>
+          <p:cNvPr id="77" name="Rectangle 76"/>
+          <p:cNvSpPr/>
+          <p:nvPr/>
+        </p:nvSpPr>
+        <p:spPr>
+          <a:xfrm>
+            <a:off x="707783" y="1897784"/>
+            <a:ext cx="2550007" cy="2590828"/>
+          </a:xfrm>
+          <a:prstGeom prst="rect">
+            <a:avLst/>
+          </a:prstGeom>
+          <a:noFill/>
+          <a:ln>
+            <a:solidFill>
+              <a:schemeClr val="bg1"/>
+            </a:solidFill>
+          </a:ln>
+        </p:spPr>
+        <p:style>
+          <a:lnRef idx="2">
+            <a:schemeClr val="accent1">
+              <a:shade val="50000"/>
+            </a:schemeClr>
+          </a:lnRef>
+          <a:fillRef idx="1">
+            <a:schemeClr val="accent1"/>
+          </a:fillRef>
+          <a:effectRef idx="0">
+            <a:schemeClr val="accent1"/>
+          </a:effectRef>
+          <a:fontRef idx="minor">
+            <a:schemeClr val="lt1"/>
+          </a:fontRef>
+        </p:style>
+        <p:txBody>
+          <a:bodyPr rtlCol="0" anchor="ctr"/>
+          <a:lstStyle/>
+          <a:p>
+            <a:pPr algn="ctr"/>
+            <a:endParaRPr lang="en-GB" sz="1801"/>
+          </a:p>
+        </p:txBody>
+      </p:sp>
+      <p:pic>
+        <p:nvPicPr>
+          <p:cNvPr id="78" name="Picture 77"/>
+          <p:cNvPicPr>
+            <a:picLocks noChangeAspect="1"/>
+          </p:cNvPicPr>
+          <p:nvPr/>
+        </p:nvPicPr>
+        <p:blipFill>
+          <a:blip r:embed="rId2" cstate="print">
+            <a:extLst>
+              <a:ext uri="{28A0092B-C50C-407E-A947-70E740481C1C}">
+                <a14:useLocalDpi xmlns:a14="http://schemas.microsoft.com/office/drawing/2010/main" val="0"/>
+              </a:ext>
+            </a:extLst>
+          </a:blip>
+          <a:stretch>
+            <a:fillRect/>
+          </a:stretch>
+        </p:blipFill>
+        <p:spPr>
+          <a:xfrm>
+            <a:off x="489639" y="1055802"/>
+            <a:ext cx="917248" cy="310526"/>
+          </a:xfrm>
+          <a:prstGeom prst="rect">
+            <a:avLst/>
+          </a:prstGeom>
+        </p:spPr>
+      </p:pic>
       <p:grpSp>
         <p:nvGrpSpPr>
-          <p:cNvPr id="2" name="Group 1"/>
+          <p:cNvPr id="81" name="Group 80"/>
           <p:cNvGrpSpPr/>
           <p:nvPr/>
         </p:nvGrpSpPr>
         <p:grpSpPr>
           <a:xfrm>
-            <a:off x="598120" y="620848"/>
-            <a:ext cx="2750273" cy="4267675"/>
-            <a:chOff x="568477" y="644294"/>
-            <a:chExt cx="3479992" cy="5400000"/>
+            <a:off x="813744" y="2255969"/>
+            <a:ext cx="2314765" cy="408244"/>
+            <a:chOff x="4399419" y="1039327"/>
+            <a:chExt cx="7409997" cy="928066"/>
           </a:xfrm>
         </p:grpSpPr>
         <p:sp>
           <p:nvSpPr>
-            <p:cNvPr id="76" name="Rectangle 75"/>
+            <p:cNvPr id="82" name="Rectangle 81"/>
             <p:cNvSpPr/>
             <p:nvPr/>
           </p:nvSpPr>
           <p:spPr>
             <a:xfrm>
-              <a:off x="628469" y="1128959"/>
-              <a:ext cx="3420000" cy="536356"/>
-            </a:xfrm>
-            <a:prstGeom prst="rect">
-              <a:avLst/>
-            </a:prstGeom>
-            <a:solidFill>
-              <a:srgbClr val="BAD80A"/>
-            </a:solidFill>
-            <a:ln>
-              <a:noFill/>
-            </a:ln>
-          </p:spPr>
-          <p:style>
-            <a:lnRef idx="2">
-              <a:schemeClr val="accent1">
-                <a:shade val="50000"/>
-              </a:schemeClr>
-            </a:lnRef>
-            <a:fillRef idx="1">
-              <a:schemeClr val="accent1"/>
-            </a:fillRef>
-            <a:effectRef idx="0">
-              <a:schemeClr val="accent1"/>
-            </a:effectRef>
-            <a:fontRef idx="minor">
-              <a:schemeClr val="lt1"/>
-            </a:fontRef>
-          </p:style>
-          <p:txBody>
-            <a:bodyPr rtlCol="0" anchor="ctr"/>
-            <a:lstStyle/>
-            <a:p>
-              <a:pPr algn="ctr"/>
-              <a:endParaRPr lang="en-GB" sz="1801"/>
-            </a:p>
-          </p:txBody>
-        </p:sp>
-        <p:sp>
-          <p:nvSpPr>
-            <p:cNvPr id="77" name="Rectangle 76"/>
-            <p:cNvSpPr/>
-            <p:nvPr/>
-          </p:nvSpPr>
-          <p:spPr>
-            <a:xfrm>
-              <a:off x="707236" y="2189273"/>
-              <a:ext cx="3226590" cy="3278242"/>
+              <a:off x="4399419" y="1435968"/>
+              <a:ext cx="1799999" cy="359999"/>
             </a:xfrm>
             <a:prstGeom prst="rect">
               <a:avLst/>
@@ -3048,7 +3172,7 @@
             <a:noFill/>
             <a:ln>
               <a:solidFill>
-                <a:schemeClr val="tx1"/>
+                <a:schemeClr val="bg1"/>
               </a:solidFill>
             </a:ln>
           </p:spPr>
@@ -3073,50 +3197,24 @@
             <a:lstStyle/>
             <a:p>
               <a:pPr algn="ctr"/>
-              <a:endParaRPr lang="en-GB" sz="1801"/>
+              <a:endParaRPr lang="en-GB" sz="1001" b="1">
+                <a:solidFill>
+                  <a:schemeClr val="bg1"/>
+                </a:solidFill>
+              </a:endParaRPr>
             </a:p>
           </p:txBody>
         </p:sp>
-        <p:pic>
-          <p:nvPicPr>
-            <p:cNvPr id="78" name="Picture 77"/>
-            <p:cNvPicPr>
-              <a:picLocks noChangeAspect="1"/>
-            </p:cNvPicPr>
-            <p:nvPr/>
-          </p:nvPicPr>
-          <p:blipFill>
-            <a:blip r:embed="rId2" cstate="print">
-              <a:extLst>
-                <a:ext uri="{28A0092B-C50C-407E-A947-70E740481C1C}">
-                  <a14:useLocalDpi xmlns:a14="http://schemas.microsoft.com/office/drawing/2010/main" val="0"/>
-                </a:ext>
-              </a:extLst>
-            </a:blip>
-            <a:stretch>
-              <a:fillRect/>
-            </a:stretch>
-          </p:blipFill>
-          <p:spPr>
-            <a:xfrm>
-              <a:off x="577067" y="1300310"/>
-              <a:ext cx="722535" cy="244608"/>
-            </a:xfrm>
-            <a:prstGeom prst="rect">
-              <a:avLst/>
-            </a:prstGeom>
-          </p:spPr>
-        </p:pic>
         <p:sp>
           <p:nvSpPr>
-            <p:cNvPr id="80" name="Rectangle 79"/>
+            <p:cNvPr id="83" name="Rectangle 82"/>
             <p:cNvSpPr/>
             <p:nvPr/>
           </p:nvSpPr>
           <p:spPr>
             <a:xfrm>
-              <a:off x="610190" y="644294"/>
-              <a:ext cx="3420000" cy="5400000"/>
+              <a:off x="4399419" y="1082286"/>
+              <a:ext cx="1799999" cy="359999"/>
             </a:xfrm>
             <a:prstGeom prst="rect">
               <a:avLst/>
@@ -3124,7 +3222,7 @@
             <a:noFill/>
             <a:ln>
               <a:solidFill>
-                <a:schemeClr val="tx1"/>
+                <a:schemeClr val="bg1"/>
               </a:solidFill>
             </a:ln>
           </p:spPr>
@@ -3149,741 +3247,24 @@
             <a:lstStyle/>
             <a:p>
               <a:pPr algn="ctr"/>
-              <a:endParaRPr lang="en-GB" sz="1801"/>
+              <a:endParaRPr lang="en-GB" sz="1001" b="1">
+                <a:solidFill>
+                  <a:schemeClr val="bg1"/>
+                </a:solidFill>
+              </a:endParaRPr>
             </a:p>
           </p:txBody>
         </p:sp>
-        <p:grpSp>
-          <p:nvGrpSpPr>
-            <p:cNvPr id="81" name="Group 80"/>
-            <p:cNvGrpSpPr/>
-            <p:nvPr/>
-          </p:nvGrpSpPr>
-          <p:grpSpPr>
-            <a:xfrm>
-              <a:off x="852397" y="2702325"/>
-              <a:ext cx="2928933" cy="451199"/>
-              <a:chOff x="4399417" y="1039327"/>
-              <a:chExt cx="7410000" cy="810634"/>
-            </a:xfrm>
-          </p:grpSpPr>
-          <p:sp>
-            <p:nvSpPr>
-              <p:cNvPr id="82" name="Rectangle 81"/>
-              <p:cNvSpPr/>
-              <p:nvPr/>
-            </p:nvSpPr>
-            <p:spPr>
-              <a:xfrm>
-                <a:off x="4399417" y="1435967"/>
-                <a:ext cx="1800000" cy="360000"/>
-              </a:xfrm>
-              <a:prstGeom prst="rect">
-                <a:avLst/>
-              </a:prstGeom>
-              <a:noFill/>
-              <a:ln>
-                <a:solidFill>
-                  <a:schemeClr val="tx1"/>
-                </a:solidFill>
-              </a:ln>
-            </p:spPr>
-            <p:style>
-              <a:lnRef idx="2">
-                <a:schemeClr val="accent1">
-                  <a:shade val="50000"/>
-                </a:schemeClr>
-              </a:lnRef>
-              <a:fillRef idx="1">
-                <a:schemeClr val="accent1"/>
-              </a:fillRef>
-              <a:effectRef idx="0">
-                <a:schemeClr val="accent1"/>
-              </a:effectRef>
-              <a:fontRef idx="minor">
-                <a:schemeClr val="lt1"/>
-              </a:fontRef>
-            </p:style>
-            <p:txBody>
-              <a:bodyPr rtlCol="0" anchor="ctr"/>
-              <a:lstStyle/>
-              <a:p>
-                <a:pPr algn="ctr"/>
-                <a:endParaRPr lang="en-GB" sz="1001" b="1"/>
-              </a:p>
-            </p:txBody>
-          </p:sp>
-          <p:sp>
-            <p:nvSpPr>
-              <p:cNvPr id="83" name="Rectangle 82"/>
-              <p:cNvSpPr/>
-              <p:nvPr/>
-            </p:nvSpPr>
-            <p:spPr>
-              <a:xfrm>
-                <a:off x="4399417" y="1082286"/>
-                <a:ext cx="1800000" cy="360000"/>
-              </a:xfrm>
-              <a:prstGeom prst="rect">
-                <a:avLst/>
-              </a:prstGeom>
-              <a:noFill/>
-              <a:ln>
-                <a:solidFill>
-                  <a:schemeClr val="tx1"/>
-                </a:solidFill>
-              </a:ln>
-            </p:spPr>
-            <p:style>
-              <a:lnRef idx="2">
-                <a:schemeClr val="accent1">
-                  <a:shade val="50000"/>
-                </a:schemeClr>
-              </a:lnRef>
-              <a:fillRef idx="1">
-                <a:schemeClr val="accent1"/>
-              </a:fillRef>
-              <a:effectRef idx="0">
-                <a:schemeClr val="accent1"/>
-              </a:effectRef>
-              <a:fontRef idx="minor">
-                <a:schemeClr val="lt1"/>
-              </a:fontRef>
-            </p:style>
-            <p:txBody>
-              <a:bodyPr rtlCol="0" anchor="ctr"/>
-              <a:lstStyle/>
-              <a:p>
-                <a:pPr algn="ctr"/>
-                <a:endParaRPr lang="en-GB" sz="1001" b="1"/>
-              </a:p>
-            </p:txBody>
-          </p:sp>
-          <p:sp>
-            <p:nvSpPr>
-              <p:cNvPr id="84" name="TextBox 83"/>
-              <p:cNvSpPr txBox="1"/>
-              <p:nvPr/>
-            </p:nvSpPr>
-            <p:spPr>
-              <a:xfrm>
-                <a:off x="4919642" y="1399325"/>
-                <a:ext cx="742965" cy="442596"/>
-              </a:xfrm>
-              <a:prstGeom prst="rect">
-                <a:avLst/>
-              </a:prstGeom>
-              <a:noFill/>
-            </p:spPr>
-            <p:txBody>
-              <a:bodyPr wrap="none" rtlCol="0">
-                <a:spAutoFit/>
-              </a:bodyPr>
-              <a:lstStyle/>
-              <a:p>
-                <a:r>
-                  <a:rPr lang="en-GB" sz="1001" b="1" dirty="0"/>
-                  <a:t>J6</a:t>
-                </a:r>
-              </a:p>
-            </p:txBody>
-          </p:sp>
-          <p:sp>
-            <p:nvSpPr>
-              <p:cNvPr id="85" name="TextBox 84"/>
-              <p:cNvSpPr txBox="1"/>
-              <p:nvPr/>
-            </p:nvSpPr>
-            <p:spPr>
-              <a:xfrm>
-                <a:off x="4923664" y="1039327"/>
-                <a:ext cx="742965" cy="442596"/>
-              </a:xfrm>
-              <a:prstGeom prst="rect">
-                <a:avLst/>
-              </a:prstGeom>
-              <a:noFill/>
-            </p:spPr>
-            <p:txBody>
-              <a:bodyPr wrap="none" rtlCol="0">
-                <a:spAutoFit/>
-              </a:bodyPr>
-              <a:lstStyle/>
-              <a:p>
-                <a:r>
-                  <a:rPr lang="en-GB" sz="1001" b="1" dirty="0"/>
-                  <a:t>J2</a:t>
-                </a:r>
-              </a:p>
-            </p:txBody>
-          </p:sp>
-          <p:sp>
-            <p:nvSpPr>
-              <p:cNvPr id="86" name="Rectangle 85"/>
-              <p:cNvSpPr/>
-              <p:nvPr/>
-            </p:nvSpPr>
-            <p:spPr>
-              <a:xfrm>
-                <a:off x="6199417" y="1435967"/>
-                <a:ext cx="1800000" cy="360000"/>
-              </a:xfrm>
-              <a:prstGeom prst="rect">
-                <a:avLst/>
-              </a:prstGeom>
-              <a:noFill/>
-              <a:ln>
-                <a:solidFill>
-                  <a:schemeClr val="tx1"/>
-                </a:solidFill>
-              </a:ln>
-            </p:spPr>
-            <p:style>
-              <a:lnRef idx="2">
-                <a:schemeClr val="accent1">
-                  <a:shade val="50000"/>
-                </a:schemeClr>
-              </a:lnRef>
-              <a:fillRef idx="1">
-                <a:schemeClr val="accent1"/>
-              </a:fillRef>
-              <a:effectRef idx="0">
-                <a:schemeClr val="accent1"/>
-              </a:effectRef>
-              <a:fontRef idx="minor">
-                <a:schemeClr val="lt1"/>
-              </a:fontRef>
-            </p:style>
-            <p:txBody>
-              <a:bodyPr rtlCol="0" anchor="ctr"/>
-              <a:lstStyle/>
-              <a:p>
-                <a:pPr algn="ctr"/>
-                <a:endParaRPr lang="en-GB" sz="1001" b="1"/>
-              </a:p>
-            </p:txBody>
-          </p:sp>
-          <p:sp>
-            <p:nvSpPr>
-              <p:cNvPr id="87" name="Rectangle 86"/>
-              <p:cNvSpPr/>
-              <p:nvPr/>
-            </p:nvSpPr>
-            <p:spPr>
-              <a:xfrm>
-                <a:off x="6199417" y="1082286"/>
-                <a:ext cx="1800000" cy="360000"/>
-              </a:xfrm>
-              <a:prstGeom prst="rect">
-                <a:avLst/>
-              </a:prstGeom>
-              <a:noFill/>
-              <a:ln>
-                <a:solidFill>
-                  <a:schemeClr val="tx1"/>
-                </a:solidFill>
-              </a:ln>
-            </p:spPr>
-            <p:style>
-              <a:lnRef idx="2">
-                <a:schemeClr val="accent1">
-                  <a:shade val="50000"/>
-                </a:schemeClr>
-              </a:lnRef>
-              <a:fillRef idx="1">
-                <a:schemeClr val="accent1"/>
-              </a:fillRef>
-              <a:effectRef idx="0">
-                <a:schemeClr val="accent1"/>
-              </a:effectRef>
-              <a:fontRef idx="minor">
-                <a:schemeClr val="lt1"/>
-              </a:fontRef>
-            </p:style>
-            <p:txBody>
-              <a:bodyPr rtlCol="0" anchor="ctr"/>
-              <a:lstStyle/>
-              <a:p>
-                <a:pPr algn="ctr"/>
-                <a:endParaRPr lang="en-GB" sz="1001" b="1"/>
-              </a:p>
-            </p:txBody>
-          </p:sp>
-          <p:sp>
-            <p:nvSpPr>
-              <p:cNvPr id="88" name="TextBox 87"/>
-              <p:cNvSpPr txBox="1"/>
-              <p:nvPr/>
-            </p:nvSpPr>
-            <p:spPr>
-              <a:xfrm>
-                <a:off x="6719645" y="1399325"/>
-                <a:ext cx="742965" cy="442596"/>
-              </a:xfrm>
-              <a:prstGeom prst="rect">
-                <a:avLst/>
-              </a:prstGeom>
-              <a:noFill/>
-            </p:spPr>
-            <p:txBody>
-              <a:bodyPr wrap="none" rtlCol="0">
-                <a:spAutoFit/>
-              </a:bodyPr>
-              <a:lstStyle/>
-              <a:p>
-                <a:r>
-                  <a:rPr lang="en-GB" sz="1001" b="1" dirty="0"/>
-                  <a:t>J7</a:t>
-                </a:r>
-              </a:p>
-            </p:txBody>
-          </p:sp>
-          <p:sp>
-            <p:nvSpPr>
-              <p:cNvPr id="89" name="TextBox 88"/>
-              <p:cNvSpPr txBox="1"/>
-              <p:nvPr/>
-            </p:nvSpPr>
-            <p:spPr>
-              <a:xfrm>
-                <a:off x="6723666" y="1039327"/>
-                <a:ext cx="742965" cy="442596"/>
-              </a:xfrm>
-              <a:prstGeom prst="rect">
-                <a:avLst/>
-              </a:prstGeom>
-              <a:noFill/>
-            </p:spPr>
-            <p:txBody>
-              <a:bodyPr wrap="none" rtlCol="0">
-                <a:spAutoFit/>
-              </a:bodyPr>
-              <a:lstStyle/>
-              <a:p>
-                <a:r>
-                  <a:rPr lang="en-GB" sz="1001" b="1" dirty="0"/>
-                  <a:t>J3</a:t>
-                </a:r>
-              </a:p>
-            </p:txBody>
-          </p:sp>
-          <p:sp>
-            <p:nvSpPr>
-              <p:cNvPr id="90" name="Rectangle 89"/>
-              <p:cNvSpPr/>
-              <p:nvPr/>
-            </p:nvSpPr>
-            <p:spPr>
-              <a:xfrm>
-                <a:off x="8209417" y="1437668"/>
-                <a:ext cx="1800000" cy="360000"/>
-              </a:xfrm>
-              <a:prstGeom prst="rect">
-                <a:avLst/>
-              </a:prstGeom>
-              <a:noFill/>
-              <a:ln>
-                <a:solidFill>
-                  <a:schemeClr val="tx1"/>
-                </a:solidFill>
-              </a:ln>
-            </p:spPr>
-            <p:style>
-              <a:lnRef idx="2">
-                <a:schemeClr val="accent1">
-                  <a:shade val="50000"/>
-                </a:schemeClr>
-              </a:lnRef>
-              <a:fillRef idx="1">
-                <a:schemeClr val="accent1"/>
-              </a:fillRef>
-              <a:effectRef idx="0">
-                <a:schemeClr val="accent1"/>
-              </a:effectRef>
-              <a:fontRef idx="minor">
-                <a:schemeClr val="lt1"/>
-              </a:fontRef>
-            </p:style>
-            <p:txBody>
-              <a:bodyPr rtlCol="0" anchor="ctr"/>
-              <a:lstStyle/>
-              <a:p>
-                <a:pPr algn="ctr"/>
-                <a:endParaRPr lang="en-GB" sz="1001" b="1"/>
-              </a:p>
-            </p:txBody>
-          </p:sp>
-          <p:sp>
-            <p:nvSpPr>
-              <p:cNvPr id="91" name="Rectangle 90"/>
-              <p:cNvSpPr/>
-              <p:nvPr/>
-            </p:nvSpPr>
-            <p:spPr>
-              <a:xfrm>
-                <a:off x="8209417" y="1076660"/>
-                <a:ext cx="1800000" cy="360000"/>
-              </a:xfrm>
-              <a:prstGeom prst="rect">
-                <a:avLst/>
-              </a:prstGeom>
-              <a:noFill/>
-              <a:ln>
-                <a:solidFill>
-                  <a:schemeClr val="tx1"/>
-                </a:solidFill>
-              </a:ln>
-            </p:spPr>
-            <p:style>
-              <a:lnRef idx="2">
-                <a:schemeClr val="accent1">
-                  <a:shade val="50000"/>
-                </a:schemeClr>
-              </a:lnRef>
-              <a:fillRef idx="1">
-                <a:schemeClr val="accent1"/>
-              </a:fillRef>
-              <a:effectRef idx="0">
-                <a:schemeClr val="accent1"/>
-              </a:effectRef>
-              <a:fontRef idx="minor">
-                <a:schemeClr val="lt1"/>
-              </a:fontRef>
-            </p:style>
-            <p:txBody>
-              <a:bodyPr rtlCol="0" anchor="ctr"/>
-              <a:lstStyle/>
-              <a:p>
-                <a:pPr algn="ctr"/>
-                <a:endParaRPr lang="en-GB" sz="1001" b="1"/>
-              </a:p>
-            </p:txBody>
-          </p:sp>
-          <p:sp>
-            <p:nvSpPr>
-              <p:cNvPr id="92" name="TextBox 91"/>
-              <p:cNvSpPr txBox="1"/>
-              <p:nvPr/>
-            </p:nvSpPr>
-            <p:spPr>
-              <a:xfrm>
-                <a:off x="8729638" y="1407365"/>
-                <a:ext cx="742965" cy="442596"/>
-              </a:xfrm>
-              <a:prstGeom prst="rect">
-                <a:avLst/>
-              </a:prstGeom>
-              <a:noFill/>
-            </p:spPr>
-            <p:txBody>
-              <a:bodyPr wrap="none" rtlCol="0">
-                <a:spAutoFit/>
-              </a:bodyPr>
-              <a:lstStyle/>
-              <a:p>
-                <a:r>
-                  <a:rPr lang="en-GB" sz="1001" b="1" dirty="0"/>
-                  <a:t>J8</a:t>
-                </a:r>
-              </a:p>
-            </p:txBody>
-          </p:sp>
-          <p:sp>
-            <p:nvSpPr>
-              <p:cNvPr id="93" name="TextBox 92"/>
-              <p:cNvSpPr txBox="1"/>
-              <p:nvPr/>
-            </p:nvSpPr>
-            <p:spPr>
-              <a:xfrm>
-                <a:off x="8733664" y="1047367"/>
-                <a:ext cx="742965" cy="442596"/>
-              </a:xfrm>
-              <a:prstGeom prst="rect">
-                <a:avLst/>
-              </a:prstGeom>
-              <a:noFill/>
-            </p:spPr>
-            <p:txBody>
-              <a:bodyPr wrap="none" rtlCol="0">
-                <a:spAutoFit/>
-              </a:bodyPr>
-              <a:lstStyle/>
-              <a:p>
-                <a:r>
-                  <a:rPr lang="en-GB" sz="1001" b="1" dirty="0"/>
-                  <a:t>J4</a:t>
-                </a:r>
-              </a:p>
-            </p:txBody>
-          </p:sp>
-          <p:sp>
-            <p:nvSpPr>
-              <p:cNvPr id="94" name="Rectangle 93"/>
-              <p:cNvSpPr/>
-              <p:nvPr/>
-            </p:nvSpPr>
-            <p:spPr>
-              <a:xfrm>
-                <a:off x="10009417" y="1437668"/>
-                <a:ext cx="1800000" cy="360000"/>
-              </a:xfrm>
-              <a:prstGeom prst="rect">
-                <a:avLst/>
-              </a:prstGeom>
-              <a:noFill/>
-              <a:ln>
-                <a:solidFill>
-                  <a:schemeClr val="tx1"/>
-                </a:solidFill>
-              </a:ln>
-            </p:spPr>
-            <p:style>
-              <a:lnRef idx="2">
-                <a:schemeClr val="accent1">
-                  <a:shade val="50000"/>
-                </a:schemeClr>
-              </a:lnRef>
-              <a:fillRef idx="1">
-                <a:schemeClr val="accent1"/>
-              </a:fillRef>
-              <a:effectRef idx="0">
-                <a:schemeClr val="accent1"/>
-              </a:effectRef>
-              <a:fontRef idx="minor">
-                <a:schemeClr val="lt1"/>
-              </a:fontRef>
-            </p:style>
-            <p:txBody>
-              <a:bodyPr rtlCol="0" anchor="ctr"/>
-              <a:lstStyle/>
-              <a:p>
-                <a:pPr algn="ctr"/>
-                <a:endParaRPr lang="en-GB" sz="1001" b="1"/>
-              </a:p>
-            </p:txBody>
-          </p:sp>
-          <p:sp>
-            <p:nvSpPr>
-              <p:cNvPr id="95" name="Rectangle 94"/>
-              <p:cNvSpPr/>
-              <p:nvPr/>
-            </p:nvSpPr>
-            <p:spPr>
-              <a:xfrm>
-                <a:off x="10009417" y="1076691"/>
-                <a:ext cx="1800000" cy="360000"/>
-              </a:xfrm>
-              <a:prstGeom prst="rect">
-                <a:avLst/>
-              </a:prstGeom>
-              <a:noFill/>
-              <a:ln>
-                <a:solidFill>
-                  <a:schemeClr val="tx1"/>
-                </a:solidFill>
-              </a:ln>
-            </p:spPr>
-            <p:style>
-              <a:lnRef idx="2">
-                <a:schemeClr val="accent1">
-                  <a:shade val="50000"/>
-                </a:schemeClr>
-              </a:lnRef>
-              <a:fillRef idx="1">
-                <a:schemeClr val="accent1"/>
-              </a:fillRef>
-              <a:effectRef idx="0">
-                <a:schemeClr val="accent1"/>
-              </a:effectRef>
-              <a:fontRef idx="minor">
-                <a:schemeClr val="lt1"/>
-              </a:fontRef>
-            </p:style>
-            <p:txBody>
-              <a:bodyPr rtlCol="0" anchor="ctr"/>
-              <a:lstStyle/>
-              <a:p>
-                <a:pPr algn="ctr"/>
-                <a:endParaRPr lang="en-GB" sz="1001" b="1"/>
-              </a:p>
-            </p:txBody>
-          </p:sp>
-          <p:sp>
-            <p:nvSpPr>
-              <p:cNvPr id="96" name="TextBox 95"/>
-              <p:cNvSpPr txBox="1"/>
-              <p:nvPr/>
-            </p:nvSpPr>
-            <p:spPr>
-              <a:xfrm>
-                <a:off x="10529637" y="1407365"/>
-                <a:ext cx="742965" cy="442596"/>
-              </a:xfrm>
-              <a:prstGeom prst="rect">
-                <a:avLst/>
-              </a:prstGeom>
-              <a:noFill/>
-            </p:spPr>
-            <p:txBody>
-              <a:bodyPr wrap="none" rtlCol="0">
-                <a:spAutoFit/>
-              </a:bodyPr>
-              <a:lstStyle/>
-              <a:p>
-                <a:r>
-                  <a:rPr lang="en-GB" sz="1001" b="1" dirty="0"/>
-                  <a:t>J9</a:t>
-                </a:r>
-              </a:p>
-            </p:txBody>
-          </p:sp>
-          <p:sp>
-            <p:nvSpPr>
-              <p:cNvPr id="97" name="TextBox 96"/>
-              <p:cNvSpPr txBox="1"/>
-              <p:nvPr/>
-            </p:nvSpPr>
-            <p:spPr>
-              <a:xfrm>
-                <a:off x="10533662" y="1047367"/>
-                <a:ext cx="742965" cy="442596"/>
-              </a:xfrm>
-              <a:prstGeom prst="rect">
-                <a:avLst/>
-              </a:prstGeom>
-              <a:noFill/>
-            </p:spPr>
-            <p:txBody>
-              <a:bodyPr wrap="none" rtlCol="0">
-                <a:spAutoFit/>
-              </a:bodyPr>
-              <a:lstStyle/>
-              <a:p>
-                <a:r>
-                  <a:rPr lang="en-GB" sz="1001" b="1" dirty="0"/>
-                  <a:t>J5</a:t>
-                </a:r>
-              </a:p>
-            </p:txBody>
-          </p:sp>
-        </p:grpSp>
         <p:sp>
           <p:nvSpPr>
-            <p:cNvPr id="98" name="TextBox 97"/>
+            <p:cNvPr id="84" name="TextBox 83"/>
             <p:cNvSpPr txBox="1"/>
             <p:nvPr/>
           </p:nvSpPr>
           <p:spPr>
             <a:xfrm>
-              <a:off x="764856" y="2356358"/>
-              <a:ext cx="3236885" cy="3388107"/>
-            </a:xfrm>
-            <a:prstGeom prst="rect">
-              <a:avLst/>
-            </a:prstGeom>
-            <a:noFill/>
-          </p:spPr>
-          <p:txBody>
-            <a:bodyPr wrap="square" rtlCol="0">
-              <a:spAutoFit/>
-            </a:bodyPr>
-            <a:lstStyle/>
-            <a:p>
-              <a:pPr marL="342904" indent="-342904">
-                <a:buAutoNum type="arabicPeriod"/>
-              </a:pPr>
-              <a:r>
-                <a:rPr lang="en-GB" sz="1200" dirty="0"/>
-                <a:t>Plug in J1-9 of MVP</a:t>
-              </a:r>
-            </a:p>
-            <a:p>
-              <a:pPr marL="342904" indent="-342904">
-                <a:buAutoNum type="arabicPeriod"/>
-              </a:pPr>
-              <a:endParaRPr lang="en-GB" sz="1200" dirty="0"/>
-            </a:p>
-            <a:p>
-              <a:pPr marL="342904" indent="-342904">
-                <a:buAutoNum type="arabicPeriod"/>
-              </a:pPr>
-              <a:endParaRPr lang="en-GB" sz="1200" dirty="0"/>
-            </a:p>
-            <a:p>
-              <a:pPr marL="342904" indent="-342904">
-                <a:buAutoNum type="arabicPeriod"/>
-              </a:pPr>
-              <a:endParaRPr lang="en-GB" sz="1200" dirty="0"/>
-            </a:p>
-            <a:p>
-              <a:pPr marL="342904" indent="-342904">
-                <a:buAutoNum type="arabicPeriod"/>
-              </a:pPr>
-              <a:r>
-                <a:rPr lang="en-GB" sz="1200" dirty="0"/>
-                <a:t>Press the green test button</a:t>
-              </a:r>
-            </a:p>
-            <a:p>
-              <a:pPr marL="342904" indent="-342904">
-                <a:buAutoNum type="arabicPeriod"/>
-              </a:pPr>
-              <a:r>
-                <a:rPr lang="en-GB" sz="1200" dirty="0"/>
-                <a:t>Board jumper configuration and revision will be auto detected</a:t>
-              </a:r>
-            </a:p>
-            <a:p>
-              <a:pPr marL="342904" indent="-342904">
-                <a:buAutoNum type="arabicPeriod"/>
-              </a:pPr>
-              <a:r>
-                <a:rPr lang="en-GB" sz="1200" dirty="0"/>
-                <a:t>LED status RED=FAIL, GREEN=PASS</a:t>
-              </a:r>
-            </a:p>
-            <a:p>
-              <a:pPr marL="342904" indent="-342904">
-                <a:buAutoNum type="arabicPeriod"/>
-              </a:pPr>
-              <a:r>
-                <a:rPr lang="en-GB" sz="1200" dirty="0"/>
-                <a:t>Connect USB connector to ANSI terminal to get </a:t>
-              </a:r>
-              <a:r>
-                <a:rPr lang="en-GB" sz="1200" dirty="0" smtClean="0"/>
-                <a:t>report</a:t>
-              </a:r>
-              <a:endParaRPr lang="en-GB" sz="1200" dirty="0"/>
-            </a:p>
-            <a:p>
-              <a:pPr marL="342904" indent="-342904">
-                <a:buAutoNum type="arabicPeriod"/>
-              </a:pPr>
-              <a:r>
-                <a:rPr lang="en-GB" sz="1200" dirty="0"/>
-                <a:t>Set up terminal to 19200 Baud 8,N,1 using FTDI driver.</a:t>
-              </a:r>
-            </a:p>
-            <a:p>
-              <a:pPr marL="342904" indent="-342904">
-                <a:buAutoNum type="arabicPeriod"/>
-              </a:pPr>
-              <a:endParaRPr lang="en-GB" sz="1200" dirty="0"/>
-            </a:p>
-          </p:txBody>
-        </p:sp>
-        <p:sp>
-          <p:nvSpPr>
-            <p:cNvPr id="99" name="TextBox 98"/>
-            <p:cNvSpPr txBox="1"/>
-            <p:nvPr/>
-          </p:nvSpPr>
-          <p:spPr>
-            <a:xfrm>
-              <a:off x="568477" y="709427"/>
-              <a:ext cx="473205" cy="307904"/>
+              <a:off x="4919644" y="1399324"/>
+              <a:ext cx="940093" cy="560028"/>
             </a:xfrm>
             <a:prstGeom prst="rect">
               <a:avLst/>
@@ -3897,23 +3278,26 @@
             <a:lstStyle/>
             <a:p>
               <a:r>
-                <a:rPr lang="en-GB" sz="1401" b="1" dirty="0"/>
-                <a:t>24V</a:t>
+                <a:rPr lang="en-GB" sz="1001" b="1" dirty="0">
+                  <a:solidFill>
+                    <a:schemeClr val="bg1"/>
+                  </a:solidFill>
+                </a:rPr>
+                <a:t>J6</a:t>
               </a:r>
-              <a:endParaRPr lang="en-GB" sz="1600" b="1" dirty="0"/>
             </a:p>
           </p:txBody>
         </p:sp>
         <p:sp>
           <p:nvSpPr>
-            <p:cNvPr id="100" name="TextBox 99"/>
+            <p:cNvPr id="85" name="TextBox 84"/>
             <p:cNvSpPr txBox="1"/>
             <p:nvPr/>
           </p:nvSpPr>
           <p:spPr>
             <a:xfrm>
-              <a:off x="1108684" y="712549"/>
-              <a:ext cx="381836" cy="307904"/>
+              <a:off x="4923665" y="1039327"/>
+              <a:ext cx="940093" cy="560028"/>
             </a:xfrm>
             <a:prstGeom prst="rect">
               <a:avLst/>
@@ -3927,63 +3311,34 @@
             <a:lstStyle/>
             <a:p>
               <a:r>
-                <a:rPr lang="en-GB" sz="1401" b="1" dirty="0"/>
-                <a:t>0V</a:t>
+                <a:rPr lang="en-GB" sz="1001" b="1" dirty="0">
+                  <a:solidFill>
+                    <a:schemeClr val="bg1"/>
+                  </a:solidFill>
+                </a:rPr>
+                <a:t>J2</a:t>
               </a:r>
-              <a:endParaRPr lang="en-GB" sz="1801" b="1" dirty="0"/>
             </a:p>
           </p:txBody>
         </p:sp>
         <p:sp>
           <p:nvSpPr>
-            <p:cNvPr id="101" name="TextBox 100"/>
-            <p:cNvSpPr txBox="1"/>
+            <p:cNvPr id="86" name="Rectangle 85"/>
+            <p:cNvSpPr/>
             <p:nvPr/>
           </p:nvSpPr>
           <p:spPr>
             <a:xfrm>
-              <a:off x="2857662" y="712549"/>
-              <a:ext cx="625492" cy="307904"/>
+              <a:off x="6199418" y="1435968"/>
+              <a:ext cx="1799999" cy="359999"/>
             </a:xfrm>
             <a:prstGeom prst="rect">
               <a:avLst/>
             </a:prstGeom>
             <a:noFill/>
-          </p:spPr>
-          <p:txBody>
-            <a:bodyPr wrap="none" rtlCol="0">
-              <a:spAutoFit/>
-            </a:bodyPr>
-            <a:lstStyle/>
-            <a:p>
-              <a:r>
-                <a:rPr lang="en-GB" sz="1401" b="1" dirty="0"/>
-                <a:t>MFVP</a:t>
-              </a:r>
-              <a:endParaRPr lang="en-GB" sz="1600" b="1" dirty="0"/>
-            </a:p>
-          </p:txBody>
-        </p:sp>
-        <p:sp>
-          <p:nvSpPr>
-            <p:cNvPr id="102" name="Isosceles Triangle 101"/>
-            <p:cNvSpPr/>
-            <p:nvPr/>
-          </p:nvSpPr>
-          <p:spPr>
-            <a:xfrm>
-              <a:off x="2738601" y="697266"/>
-              <a:ext cx="119061" cy="61912"/>
-            </a:xfrm>
-            <a:prstGeom prst="triangle">
-              <a:avLst/>
-            </a:prstGeom>
-            <a:solidFill>
-              <a:schemeClr val="tx1"/>
-            </a:solidFill>
             <a:ln>
               <a:solidFill>
-                <a:schemeClr val="tx1"/>
+                <a:schemeClr val="bg1"/>
               </a:solidFill>
             </a:ln>
           </p:spPr>
@@ -4004,39 +3359,36 @@
             </a:fontRef>
           </p:style>
           <p:txBody>
-            <a:bodyPr rot="0" spcFirstLastPara="0" vertOverflow="overflow" horzOverflow="overflow" vert="horz" wrap="square" lIns="91440" tIns="45721" rIns="91440" bIns="45721" numCol="1" spcCol="0" rtlCol="0" fromWordArt="0" anchor="ctr" anchorCtr="0" forceAA="0" compatLnSpc="1">
-              <a:prstTxWarp prst="textNoShape">
-                <a:avLst/>
-              </a:prstTxWarp>
-              <a:noAutofit/>
-            </a:bodyPr>
+            <a:bodyPr rtlCol="0" anchor="ctr"/>
             <a:lstStyle/>
             <a:p>
               <a:pPr algn="ctr"/>
-              <a:endParaRPr lang="en-GB" sz="1801"/>
+              <a:endParaRPr lang="en-GB" sz="1001" b="1">
+                <a:solidFill>
+                  <a:schemeClr val="bg1"/>
+                </a:solidFill>
+              </a:endParaRPr>
             </a:p>
           </p:txBody>
         </p:sp>
         <p:sp>
           <p:nvSpPr>
-            <p:cNvPr id="103" name="Isosceles Triangle 102"/>
+            <p:cNvPr id="87" name="Rectangle 86"/>
             <p:cNvSpPr/>
             <p:nvPr/>
           </p:nvSpPr>
           <p:spPr>
             <a:xfrm>
-              <a:off x="792866" y="697266"/>
-              <a:ext cx="119061" cy="61912"/>
+              <a:off x="6199418" y="1082286"/>
+              <a:ext cx="1799999" cy="359999"/>
             </a:xfrm>
-            <a:prstGeom prst="triangle">
+            <a:prstGeom prst="rect">
               <a:avLst/>
             </a:prstGeom>
-            <a:solidFill>
-              <a:schemeClr val="tx1"/>
-            </a:solidFill>
+            <a:noFill/>
             <a:ln>
               <a:solidFill>
-                <a:schemeClr val="tx1"/>
+                <a:schemeClr val="bg1"/>
               </a:solidFill>
             </a:ln>
           </p:spPr>
@@ -4057,39 +3409,102 @@
             </a:fontRef>
           </p:style>
           <p:txBody>
-            <a:bodyPr rot="0" spcFirstLastPara="0" vertOverflow="overflow" horzOverflow="overflow" vert="horz" wrap="square" lIns="91440" tIns="45721" rIns="91440" bIns="45721" numCol="1" spcCol="0" rtlCol="0" fromWordArt="0" anchor="ctr" anchorCtr="0" forceAA="0" compatLnSpc="1">
-              <a:prstTxWarp prst="textNoShape">
-                <a:avLst/>
-              </a:prstTxWarp>
-              <a:noAutofit/>
-            </a:bodyPr>
+            <a:bodyPr rtlCol="0" anchor="ctr"/>
             <a:lstStyle/>
             <a:p>
               <a:pPr algn="ctr"/>
-              <a:endParaRPr lang="en-GB" sz="1801"/>
+              <a:endParaRPr lang="en-GB" sz="1001" b="1">
+                <a:solidFill>
+                  <a:schemeClr val="bg1"/>
+                </a:solidFill>
+              </a:endParaRPr>
             </a:p>
           </p:txBody>
         </p:sp>
         <p:sp>
           <p:nvSpPr>
-            <p:cNvPr id="104" name="Isosceles Triangle 103"/>
+            <p:cNvPr id="88" name="TextBox 87"/>
+            <p:cNvSpPr txBox="1"/>
+            <p:nvPr/>
+          </p:nvSpPr>
+          <p:spPr>
+            <a:xfrm>
+              <a:off x="6719646" y="1399324"/>
+              <a:ext cx="940093" cy="560028"/>
+            </a:xfrm>
+            <a:prstGeom prst="rect">
+              <a:avLst/>
+            </a:prstGeom>
+            <a:noFill/>
+          </p:spPr>
+          <p:txBody>
+            <a:bodyPr wrap="none" rtlCol="0">
+              <a:spAutoFit/>
+            </a:bodyPr>
+            <a:lstStyle/>
+            <a:p>
+              <a:r>
+                <a:rPr lang="en-GB" sz="1001" b="1" dirty="0">
+                  <a:solidFill>
+                    <a:schemeClr val="bg1"/>
+                  </a:solidFill>
+                </a:rPr>
+                <a:t>J7</a:t>
+              </a:r>
+            </a:p>
+          </p:txBody>
+        </p:sp>
+        <p:sp>
+          <p:nvSpPr>
+            <p:cNvPr id="89" name="TextBox 88"/>
+            <p:cNvSpPr txBox="1"/>
+            <p:nvPr/>
+          </p:nvSpPr>
+          <p:spPr>
+            <a:xfrm>
+              <a:off x="6723667" y="1039327"/>
+              <a:ext cx="940093" cy="560028"/>
+            </a:xfrm>
+            <a:prstGeom prst="rect">
+              <a:avLst/>
+            </a:prstGeom>
+            <a:noFill/>
+          </p:spPr>
+          <p:txBody>
+            <a:bodyPr wrap="none" rtlCol="0">
+              <a:spAutoFit/>
+            </a:bodyPr>
+            <a:lstStyle/>
+            <a:p>
+              <a:r>
+                <a:rPr lang="en-GB" sz="1001" b="1" dirty="0">
+                  <a:solidFill>
+                    <a:schemeClr val="bg1"/>
+                  </a:solidFill>
+                </a:rPr>
+                <a:t>J3</a:t>
+              </a:r>
+            </a:p>
+          </p:txBody>
+        </p:sp>
+        <p:sp>
+          <p:nvSpPr>
+            <p:cNvPr id="90" name="Rectangle 89"/>
             <p:cNvSpPr/>
             <p:nvPr/>
           </p:nvSpPr>
           <p:spPr>
             <a:xfrm>
-              <a:off x="1299602" y="701546"/>
-              <a:ext cx="119061" cy="61913"/>
+              <a:off x="8209418" y="1437668"/>
+              <a:ext cx="1799999" cy="359999"/>
             </a:xfrm>
-            <a:prstGeom prst="triangle">
+            <a:prstGeom prst="rect">
               <a:avLst/>
             </a:prstGeom>
-            <a:solidFill>
-              <a:schemeClr val="tx1"/>
-            </a:solidFill>
+            <a:noFill/>
             <a:ln>
               <a:solidFill>
-                <a:schemeClr val="tx1"/>
+                <a:schemeClr val="bg1"/>
               </a:solidFill>
             </a:ln>
           </p:spPr>
@@ -4110,39 +3525,36 @@
             </a:fontRef>
           </p:style>
           <p:txBody>
-            <a:bodyPr rot="0" spcFirstLastPara="0" vertOverflow="overflow" horzOverflow="overflow" vert="horz" wrap="square" lIns="91440" tIns="45721" rIns="91440" bIns="45721" numCol="1" spcCol="0" rtlCol="0" fromWordArt="0" anchor="ctr" anchorCtr="0" forceAA="0" compatLnSpc="1">
-              <a:prstTxWarp prst="textNoShape">
-                <a:avLst/>
-              </a:prstTxWarp>
-              <a:noAutofit/>
-            </a:bodyPr>
+            <a:bodyPr rtlCol="0" anchor="ctr"/>
             <a:lstStyle/>
             <a:p>
               <a:pPr algn="ctr"/>
-              <a:endParaRPr lang="en-GB" sz="1801"/>
+              <a:endParaRPr lang="en-GB" sz="1001" b="1">
+                <a:solidFill>
+                  <a:schemeClr val="bg1"/>
+                </a:solidFill>
+              </a:endParaRPr>
             </a:p>
           </p:txBody>
         </p:sp>
         <p:sp>
           <p:nvSpPr>
-            <p:cNvPr id="105" name="Isosceles Triangle 104"/>
+            <p:cNvPr id="91" name="Rectangle 90"/>
             <p:cNvSpPr/>
             <p:nvPr/>
           </p:nvSpPr>
           <p:spPr>
             <a:xfrm>
-              <a:off x="3599310" y="709427"/>
-              <a:ext cx="119061" cy="61912"/>
+              <a:off x="8209418" y="1076660"/>
+              <a:ext cx="1799999" cy="359999"/>
             </a:xfrm>
-            <a:prstGeom prst="triangle">
+            <a:prstGeom prst="rect">
               <a:avLst/>
             </a:prstGeom>
-            <a:solidFill>
-              <a:schemeClr val="tx1"/>
-            </a:solidFill>
+            <a:noFill/>
             <a:ln>
               <a:solidFill>
-                <a:schemeClr val="tx1"/>
+                <a:schemeClr val="bg1"/>
               </a:solidFill>
             </a:ln>
           </p:spPr>
@@ -4163,29 +3575,28 @@
             </a:fontRef>
           </p:style>
           <p:txBody>
-            <a:bodyPr rot="0" spcFirstLastPara="0" vertOverflow="overflow" horzOverflow="overflow" vert="horz" wrap="square" lIns="91440" tIns="45721" rIns="91440" bIns="45721" numCol="1" spcCol="0" rtlCol="0" fromWordArt="0" anchor="ctr" anchorCtr="0" forceAA="0" compatLnSpc="1">
-              <a:prstTxWarp prst="textNoShape">
-                <a:avLst/>
-              </a:prstTxWarp>
-              <a:noAutofit/>
-            </a:bodyPr>
+            <a:bodyPr rtlCol="0" anchor="ctr"/>
             <a:lstStyle/>
             <a:p>
               <a:pPr algn="ctr"/>
-              <a:endParaRPr lang="en-GB" sz="1801"/>
+              <a:endParaRPr lang="en-GB" sz="1001" b="1">
+                <a:solidFill>
+                  <a:schemeClr val="bg1"/>
+                </a:solidFill>
+              </a:endParaRPr>
             </a:p>
           </p:txBody>
         </p:sp>
         <p:sp>
           <p:nvSpPr>
-            <p:cNvPr id="106" name="TextBox 105"/>
+            <p:cNvPr id="92" name="TextBox 91"/>
             <p:cNvSpPr txBox="1"/>
             <p:nvPr/>
           </p:nvSpPr>
           <p:spPr>
             <a:xfrm>
-              <a:off x="698460" y="5613024"/>
-              <a:ext cx="479747" cy="307904"/>
+              <a:off x="8729637" y="1407365"/>
+              <a:ext cx="940093" cy="560028"/>
             </a:xfrm>
             <a:prstGeom prst="rect">
               <a:avLst/>
@@ -4199,33 +3610,67 @@
             <a:lstStyle/>
             <a:p>
               <a:r>
-                <a:rPr lang="en-GB" sz="1401" b="1" dirty="0" smtClean="0"/>
-                <a:t>Test</a:t>
+                <a:rPr lang="en-GB" sz="1001" b="1" dirty="0">
+                  <a:solidFill>
+                    <a:schemeClr val="bg1"/>
+                  </a:solidFill>
+                </a:rPr>
+                <a:t>J8</a:t>
               </a:r>
-              <a:endParaRPr lang="en-GB" sz="1600" b="1" dirty="0"/>
             </a:p>
           </p:txBody>
         </p:sp>
         <p:sp>
           <p:nvSpPr>
-            <p:cNvPr id="107" name="Isosceles Triangle 106"/>
+            <p:cNvPr id="93" name="TextBox 92"/>
+            <p:cNvSpPr txBox="1"/>
+            <p:nvPr/>
+          </p:nvSpPr>
+          <p:spPr>
+            <a:xfrm>
+              <a:off x="8733664" y="1047368"/>
+              <a:ext cx="940093" cy="560028"/>
+            </a:xfrm>
+            <a:prstGeom prst="rect">
+              <a:avLst/>
+            </a:prstGeom>
+            <a:noFill/>
+          </p:spPr>
+          <p:txBody>
+            <a:bodyPr wrap="none" rtlCol="0">
+              <a:spAutoFit/>
+            </a:bodyPr>
+            <a:lstStyle/>
+            <a:p>
+              <a:r>
+                <a:rPr lang="en-GB" sz="1001" b="1" dirty="0">
+                  <a:solidFill>
+                    <a:schemeClr val="bg1"/>
+                  </a:solidFill>
+                </a:rPr>
+                <a:t>J4</a:t>
+              </a:r>
+            </a:p>
+          </p:txBody>
+        </p:sp>
+        <p:sp>
+          <p:nvSpPr>
+            <p:cNvPr id="94" name="Rectangle 93"/>
             <p:cNvSpPr/>
             <p:nvPr/>
           </p:nvSpPr>
           <p:spPr>
-            <a:xfrm flipV="1">
-              <a:off x="926260" y="5913181"/>
-              <a:ext cx="119061" cy="61913"/>
+            <a:xfrm>
+              <a:off x="10009417" y="1437668"/>
+              <a:ext cx="1799999" cy="359999"/>
             </a:xfrm>
-            <a:prstGeom prst="triangle">
+            <a:prstGeom prst="rect">
               <a:avLst/>
             </a:prstGeom>
-            <a:solidFill>
-              <a:schemeClr val="tx1"/>
-            </a:solidFill>
+            <a:noFill/>
             <a:ln>
               <a:solidFill>
-                <a:schemeClr val="tx1"/>
+                <a:schemeClr val="bg1"/>
               </a:solidFill>
             </a:ln>
           </p:spPr>
@@ -4246,69 +3691,36 @@
             </a:fontRef>
           </p:style>
           <p:txBody>
-            <a:bodyPr rot="0" spcFirstLastPara="0" vertOverflow="overflow" horzOverflow="overflow" vert="horz" wrap="square" lIns="91440" tIns="45721" rIns="91440" bIns="45721" numCol="1" spcCol="0" rtlCol="0" fromWordArt="0" anchor="ctr" anchorCtr="0" forceAA="0" compatLnSpc="1">
-              <a:prstTxWarp prst="textNoShape">
-                <a:avLst/>
-              </a:prstTxWarp>
-              <a:noAutofit/>
-            </a:bodyPr>
+            <a:bodyPr rtlCol="0" anchor="ctr"/>
             <a:lstStyle/>
             <a:p>
               <a:pPr algn="ctr"/>
-              <a:endParaRPr lang="en-GB" sz="1801"/>
+              <a:endParaRPr lang="en-GB" sz="1001" b="1">
+                <a:solidFill>
+                  <a:schemeClr val="bg1"/>
+                </a:solidFill>
+              </a:endParaRPr>
             </a:p>
           </p:txBody>
         </p:sp>
         <p:sp>
           <p:nvSpPr>
-            <p:cNvPr id="108" name="TextBox 107"/>
-            <p:cNvSpPr txBox="1"/>
+            <p:cNvPr id="95" name="Rectangle 94"/>
+            <p:cNvSpPr/>
             <p:nvPr/>
           </p:nvSpPr>
           <p:spPr>
             <a:xfrm>
-              <a:off x="699238" y="1852592"/>
-              <a:ext cx="1069139" cy="307905"/>
+              <a:off x="10009417" y="1076691"/>
+              <a:ext cx="1799999" cy="359999"/>
             </a:xfrm>
             <a:prstGeom prst="rect">
               <a:avLst/>
             </a:prstGeom>
             <a:noFill/>
-          </p:spPr>
-          <p:txBody>
-            <a:bodyPr wrap="none" rtlCol="0">
-              <a:spAutoFit/>
-            </a:bodyPr>
-            <a:lstStyle/>
-            <a:p>
-              <a:r>
-                <a:rPr lang="en-GB" sz="1401" b="1" dirty="0"/>
-                <a:t>Instructions</a:t>
-              </a:r>
-              <a:endParaRPr lang="en-GB" sz="1600" b="1" dirty="0"/>
-            </a:p>
-          </p:txBody>
-        </p:sp>
-        <p:sp>
-          <p:nvSpPr>
-            <p:cNvPr id="109" name="Isosceles Triangle 108"/>
-            <p:cNvSpPr/>
-            <p:nvPr/>
-          </p:nvSpPr>
-          <p:spPr>
-            <a:xfrm flipV="1">
-              <a:off x="1583740" y="5913181"/>
-              <a:ext cx="119061" cy="61913"/>
-            </a:xfrm>
-            <a:prstGeom prst="triangle">
-              <a:avLst/>
-            </a:prstGeom>
-            <a:solidFill>
-              <a:schemeClr val="tx1"/>
-            </a:solidFill>
             <a:ln>
               <a:solidFill>
-                <a:schemeClr val="tx1"/>
+                <a:schemeClr val="bg1"/>
               </a:solidFill>
             </a:ln>
           </p:spPr>
@@ -4329,29 +3741,28 @@
             </a:fontRef>
           </p:style>
           <p:txBody>
-            <a:bodyPr rot="0" spcFirstLastPara="0" vertOverflow="overflow" horzOverflow="overflow" vert="horz" wrap="square" lIns="91440" tIns="45721" rIns="91440" bIns="45721" numCol="1" spcCol="0" rtlCol="0" fromWordArt="0" anchor="ctr" anchorCtr="0" forceAA="0" compatLnSpc="1">
-              <a:prstTxWarp prst="textNoShape">
-                <a:avLst/>
-              </a:prstTxWarp>
-              <a:noAutofit/>
-            </a:bodyPr>
+            <a:bodyPr rtlCol="0" anchor="ctr"/>
             <a:lstStyle/>
             <a:p>
               <a:pPr algn="ctr"/>
-              <a:endParaRPr lang="en-GB" sz="1801"/>
+              <a:endParaRPr lang="en-GB" sz="1001" b="1">
+                <a:solidFill>
+                  <a:schemeClr val="bg1"/>
+                </a:solidFill>
+              </a:endParaRPr>
             </a:p>
           </p:txBody>
         </p:sp>
         <p:sp>
           <p:nvSpPr>
-            <p:cNvPr id="110" name="TextBox 109"/>
+            <p:cNvPr id="96" name="TextBox 95"/>
             <p:cNvSpPr txBox="1"/>
             <p:nvPr/>
           </p:nvSpPr>
           <p:spPr>
             <a:xfrm>
-              <a:off x="1259870" y="5601544"/>
-              <a:ext cx="647741" cy="307904"/>
+              <a:off x="10529636" y="1407365"/>
+              <a:ext cx="940093" cy="560028"/>
             </a:xfrm>
             <a:prstGeom prst="rect">
               <a:avLst/>
@@ -4365,24 +3776,827 @@
             <a:lstStyle/>
             <a:p>
               <a:r>
-                <a:rPr lang="en-GB" sz="1401" b="1" dirty="0" smtClean="0"/>
-                <a:t>Status</a:t>
+                <a:rPr lang="en-GB" sz="1001" b="1" dirty="0">
+                  <a:solidFill>
+                    <a:schemeClr val="bg1"/>
+                  </a:solidFill>
+                </a:rPr>
+                <a:t>J9</a:t>
               </a:r>
-              <a:endParaRPr lang="en-GB" sz="1600" b="1" dirty="0"/>
+            </a:p>
+          </p:txBody>
+        </p:sp>
+        <p:sp>
+          <p:nvSpPr>
+            <p:cNvPr id="97" name="TextBox 96"/>
+            <p:cNvSpPr txBox="1"/>
+            <p:nvPr/>
+          </p:nvSpPr>
+          <p:spPr>
+            <a:xfrm>
+              <a:off x="10533663" y="1047368"/>
+              <a:ext cx="940093" cy="560028"/>
+            </a:xfrm>
+            <a:prstGeom prst="rect">
+              <a:avLst/>
+            </a:prstGeom>
+            <a:noFill/>
+          </p:spPr>
+          <p:txBody>
+            <a:bodyPr wrap="none" rtlCol="0">
+              <a:spAutoFit/>
+            </a:bodyPr>
+            <a:lstStyle/>
+            <a:p>
+              <a:r>
+                <a:rPr lang="en-GB" sz="1001" b="1" dirty="0">
+                  <a:solidFill>
+                    <a:schemeClr val="bg1"/>
+                  </a:solidFill>
+                </a:rPr>
+                <a:t>J5</a:t>
+              </a:r>
             </a:p>
           </p:txBody>
         </p:sp>
       </p:grpSp>
       <p:sp>
         <p:nvSpPr>
+          <p:cNvPr id="98" name="TextBox 97"/>
+          <p:cNvSpPr txBox="1"/>
+          <p:nvPr/>
+        </p:nvSpPr>
+        <p:spPr>
+          <a:xfrm>
+            <a:off x="737504" y="1905601"/>
+            <a:ext cx="2504470" cy="2677656"/>
+          </a:xfrm>
+          <a:prstGeom prst="rect">
+            <a:avLst/>
+          </a:prstGeom>
+          <a:noFill/>
+          <a:ln>
+            <a:noFill/>
+          </a:ln>
+        </p:spPr>
+        <p:txBody>
+          <a:bodyPr wrap="square" rtlCol="0">
+            <a:spAutoFit/>
+          </a:bodyPr>
+          <a:lstStyle/>
+          <a:p>
+            <a:pPr marL="342904" indent="-342904">
+              <a:buAutoNum type="arabicPeriod"/>
+            </a:pPr>
+            <a:r>
+              <a:rPr lang="en-GB" sz="1200" dirty="0">
+                <a:solidFill>
+                  <a:schemeClr val="bg1"/>
+                </a:solidFill>
+              </a:rPr>
+              <a:t>Plug in J1-9 of </a:t>
+            </a:r>
+            <a:r>
+              <a:rPr lang="en-GB" sz="1200" dirty="0" smtClean="0">
+                <a:solidFill>
+                  <a:schemeClr val="bg1"/>
+                </a:solidFill>
+              </a:rPr>
+              <a:t>MVP:</a:t>
+            </a:r>
+            <a:endParaRPr lang="en-GB" sz="1200" dirty="0">
+              <a:solidFill>
+                <a:schemeClr val="bg1"/>
+              </a:solidFill>
+            </a:endParaRPr>
+          </a:p>
+          <a:p>
+            <a:pPr marL="342904" indent="-342904">
+              <a:buAutoNum type="arabicPeriod"/>
+            </a:pPr>
+            <a:endParaRPr lang="en-GB" sz="1200" dirty="0">
+              <a:solidFill>
+                <a:schemeClr val="bg1"/>
+              </a:solidFill>
+            </a:endParaRPr>
+          </a:p>
+          <a:p>
+            <a:pPr marL="342904" indent="-342904">
+              <a:buAutoNum type="arabicPeriod"/>
+            </a:pPr>
+            <a:endParaRPr lang="en-GB" sz="1200" dirty="0">
+              <a:solidFill>
+                <a:schemeClr val="bg1"/>
+              </a:solidFill>
+            </a:endParaRPr>
+          </a:p>
+          <a:p>
+            <a:pPr marL="342904" indent="-342904">
+              <a:buAutoNum type="arabicPeriod"/>
+            </a:pPr>
+            <a:endParaRPr lang="en-GB" sz="1200" dirty="0">
+              <a:solidFill>
+                <a:schemeClr val="bg1"/>
+              </a:solidFill>
+            </a:endParaRPr>
+          </a:p>
+          <a:p>
+            <a:pPr marL="342904" indent="-342904">
+              <a:buAutoNum type="arabicPeriod"/>
+            </a:pPr>
+            <a:r>
+              <a:rPr lang="en-GB" sz="1200" dirty="0">
+                <a:solidFill>
+                  <a:schemeClr val="bg1"/>
+                </a:solidFill>
+              </a:rPr>
+              <a:t>Press the green test button</a:t>
+            </a:r>
+          </a:p>
+          <a:p>
+            <a:pPr marL="342904" indent="-342904">
+              <a:buAutoNum type="arabicPeriod"/>
+            </a:pPr>
+            <a:r>
+              <a:rPr lang="en-GB" sz="1200" dirty="0">
+                <a:solidFill>
+                  <a:schemeClr val="bg1"/>
+                </a:solidFill>
+              </a:rPr>
+              <a:t>Board jumper configuration and revision will be auto detected</a:t>
+            </a:r>
+          </a:p>
+          <a:p>
+            <a:pPr marL="342904" indent="-342904">
+              <a:buAutoNum type="arabicPeriod"/>
+            </a:pPr>
+            <a:r>
+              <a:rPr lang="en-GB" sz="1200" dirty="0">
+                <a:solidFill>
+                  <a:schemeClr val="bg1"/>
+                </a:solidFill>
+              </a:rPr>
+              <a:t>LED status RED=FAIL, GREEN=PASS</a:t>
+            </a:r>
+          </a:p>
+          <a:p>
+            <a:pPr marL="342904" indent="-342904">
+              <a:buAutoNum type="arabicPeriod"/>
+            </a:pPr>
+            <a:r>
+              <a:rPr lang="en-GB" sz="1200" dirty="0">
+                <a:solidFill>
+                  <a:schemeClr val="bg1"/>
+                </a:solidFill>
+              </a:rPr>
+              <a:t>Connect USB connector to </a:t>
+            </a:r>
+            <a:r>
+              <a:rPr lang="en-GB" sz="1200" dirty="0" smtClean="0">
+                <a:solidFill>
+                  <a:schemeClr val="bg1"/>
+                </a:solidFill>
+              </a:rPr>
+              <a:t>terminal </a:t>
+            </a:r>
+            <a:r>
+              <a:rPr lang="en-GB" sz="1200" dirty="0">
+                <a:solidFill>
+                  <a:schemeClr val="bg1"/>
+                </a:solidFill>
+              </a:rPr>
+              <a:t>to get </a:t>
+            </a:r>
+            <a:r>
+              <a:rPr lang="en-GB" sz="1200" dirty="0" smtClean="0">
+                <a:solidFill>
+                  <a:schemeClr val="bg1"/>
+                </a:solidFill>
+              </a:rPr>
+              <a:t>report</a:t>
+            </a:r>
+            <a:endParaRPr lang="en-GB" sz="1200" dirty="0">
+              <a:solidFill>
+                <a:schemeClr val="bg1"/>
+              </a:solidFill>
+            </a:endParaRPr>
+          </a:p>
+          <a:p>
+            <a:pPr marL="342904" indent="-342904">
+              <a:buAutoNum type="arabicPeriod"/>
+            </a:pPr>
+            <a:r>
+              <a:rPr lang="en-GB" sz="1200" dirty="0">
+                <a:solidFill>
+                  <a:schemeClr val="bg1"/>
+                </a:solidFill>
+              </a:rPr>
+              <a:t>Set up </a:t>
+            </a:r>
+            <a:r>
+              <a:rPr lang="en-GB" sz="1200" dirty="0" smtClean="0">
+                <a:solidFill>
+                  <a:schemeClr val="bg1"/>
+                </a:solidFill>
+              </a:rPr>
+              <a:t> as 19200 </a:t>
+            </a:r>
+            <a:r>
+              <a:rPr lang="en-GB" sz="1200" dirty="0">
+                <a:solidFill>
+                  <a:schemeClr val="bg1"/>
+                </a:solidFill>
+              </a:rPr>
+              <a:t>Baud 8,N,1 </a:t>
+            </a:r>
+            <a:r>
+              <a:rPr lang="en-GB" sz="1200" dirty="0" smtClean="0">
+                <a:solidFill>
+                  <a:schemeClr val="bg1"/>
+                </a:solidFill>
+              </a:rPr>
+              <a:t>/ ANSI emulation / FTDI driver</a:t>
+            </a:r>
+            <a:endParaRPr lang="en-GB" sz="1200" dirty="0">
+              <a:solidFill>
+                <a:schemeClr val="bg1"/>
+              </a:solidFill>
+            </a:endParaRPr>
+          </a:p>
+          <a:p>
+            <a:pPr marL="342904" indent="-342904">
+              <a:buAutoNum type="arabicPeriod"/>
+            </a:pPr>
+            <a:endParaRPr lang="en-GB" sz="1200" dirty="0">
+              <a:solidFill>
+                <a:schemeClr val="bg1"/>
+              </a:solidFill>
+            </a:endParaRPr>
+          </a:p>
+        </p:txBody>
+      </p:sp>
+      <p:sp>
+        <p:nvSpPr>
+          <p:cNvPr id="99" name="TextBox 98"/>
+          <p:cNvSpPr txBox="1"/>
+          <p:nvPr/>
+        </p:nvSpPr>
+        <p:spPr>
+          <a:xfrm>
+            <a:off x="598120" y="624693"/>
+            <a:ext cx="473206" cy="307905"/>
+          </a:xfrm>
+          <a:prstGeom prst="rect">
+            <a:avLst/>
+          </a:prstGeom>
+          <a:noFill/>
+        </p:spPr>
+        <p:txBody>
+          <a:bodyPr wrap="none" rtlCol="0">
+            <a:spAutoFit/>
+          </a:bodyPr>
+          <a:lstStyle/>
+          <a:p>
+            <a:r>
+              <a:rPr lang="en-GB" sz="1401" b="1" dirty="0">
+                <a:solidFill>
+                  <a:schemeClr val="bg1"/>
+                </a:solidFill>
+              </a:rPr>
+              <a:t>24V</a:t>
+            </a:r>
+            <a:endParaRPr lang="en-GB" sz="1600" b="1" dirty="0">
+              <a:solidFill>
+                <a:schemeClr val="bg1"/>
+              </a:solidFill>
+            </a:endParaRPr>
+          </a:p>
+        </p:txBody>
+      </p:sp>
+      <p:sp>
+        <p:nvSpPr>
+          <p:cNvPr id="100" name="TextBox 99"/>
+          <p:cNvSpPr txBox="1"/>
+          <p:nvPr/>
+        </p:nvSpPr>
+        <p:spPr>
+          <a:xfrm>
+            <a:off x="1025051" y="627161"/>
+            <a:ext cx="381836" cy="307905"/>
+          </a:xfrm>
+          <a:prstGeom prst="rect">
+            <a:avLst/>
+          </a:prstGeom>
+          <a:noFill/>
+        </p:spPr>
+        <p:txBody>
+          <a:bodyPr wrap="none" rtlCol="0">
+            <a:spAutoFit/>
+          </a:bodyPr>
+          <a:lstStyle/>
+          <a:p>
+            <a:r>
+              <a:rPr lang="en-GB" sz="1401" b="1" dirty="0">
+                <a:solidFill>
+                  <a:schemeClr val="bg1"/>
+                </a:solidFill>
+              </a:rPr>
+              <a:t>0V</a:t>
+            </a:r>
+            <a:endParaRPr lang="en-GB" sz="1801" b="1" dirty="0">
+              <a:solidFill>
+                <a:schemeClr val="bg1"/>
+              </a:solidFill>
+            </a:endParaRPr>
+          </a:p>
+        </p:txBody>
+      </p:sp>
+      <p:sp>
+        <p:nvSpPr>
+          <p:cNvPr id="101" name="TextBox 100"/>
+          <p:cNvSpPr txBox="1"/>
+          <p:nvPr/>
+        </p:nvSpPr>
+        <p:spPr>
+          <a:xfrm>
+            <a:off x="2488257" y="603346"/>
+            <a:ext cx="625492" cy="307905"/>
+          </a:xfrm>
+          <a:prstGeom prst="rect">
+            <a:avLst/>
+          </a:prstGeom>
+          <a:noFill/>
+        </p:spPr>
+        <p:txBody>
+          <a:bodyPr wrap="none" rtlCol="0">
+            <a:spAutoFit/>
+          </a:bodyPr>
+          <a:lstStyle/>
+          <a:p>
+            <a:r>
+              <a:rPr lang="en-GB" sz="1401" b="1" dirty="0">
+                <a:solidFill>
+                  <a:schemeClr val="bg1"/>
+                </a:solidFill>
+              </a:rPr>
+              <a:t>MFVP</a:t>
+            </a:r>
+            <a:endParaRPr lang="en-GB" sz="1600" b="1" dirty="0">
+              <a:solidFill>
+                <a:schemeClr val="bg1"/>
+              </a:solidFill>
+            </a:endParaRPr>
+          </a:p>
+        </p:txBody>
+      </p:sp>
+      <p:sp>
+        <p:nvSpPr>
+          <p:cNvPr id="102" name="Isosceles Triangle 101"/>
+          <p:cNvSpPr/>
+          <p:nvPr/>
+        </p:nvSpPr>
+        <p:spPr>
+          <a:xfrm>
+            <a:off x="2317954" y="610319"/>
+            <a:ext cx="94095" cy="48930"/>
+          </a:xfrm>
+          <a:prstGeom prst="triangle">
+            <a:avLst/>
+          </a:prstGeom>
+          <a:solidFill>
+            <a:schemeClr val="bg1"/>
+          </a:solidFill>
+          <a:ln>
+            <a:solidFill>
+              <a:schemeClr val="bg1"/>
+            </a:solidFill>
+          </a:ln>
+        </p:spPr>
+        <p:style>
+          <a:lnRef idx="2">
+            <a:schemeClr val="accent1">
+              <a:shade val="50000"/>
+            </a:schemeClr>
+          </a:lnRef>
+          <a:fillRef idx="1">
+            <a:schemeClr val="accent1"/>
+          </a:fillRef>
+          <a:effectRef idx="0">
+            <a:schemeClr val="accent1"/>
+          </a:effectRef>
+          <a:fontRef idx="minor">
+            <a:schemeClr val="lt1"/>
+          </a:fontRef>
+        </p:style>
+        <p:txBody>
+          <a:bodyPr rot="0" spcFirstLastPara="0" vertOverflow="overflow" horzOverflow="overflow" vert="horz" wrap="square" lIns="91440" tIns="45721" rIns="91440" bIns="45721" numCol="1" spcCol="0" rtlCol="0" fromWordArt="0" anchor="ctr" anchorCtr="0" forceAA="0" compatLnSpc="1">
+            <a:prstTxWarp prst="textNoShape">
+              <a:avLst/>
+            </a:prstTxWarp>
+            <a:noAutofit/>
+          </a:bodyPr>
+          <a:lstStyle/>
+          <a:p>
+            <a:pPr algn="ctr"/>
+            <a:endParaRPr lang="en-GB" sz="1801">
+              <a:solidFill>
+                <a:schemeClr val="bg1"/>
+              </a:solidFill>
+            </a:endParaRPr>
+          </a:p>
+        </p:txBody>
+      </p:sp>
+      <p:sp>
+        <p:nvSpPr>
+          <p:cNvPr id="103" name="Isosceles Triangle 102"/>
+          <p:cNvSpPr/>
+          <p:nvPr/>
+        </p:nvSpPr>
+        <p:spPr>
+          <a:xfrm>
+            <a:off x="775457" y="615082"/>
+            <a:ext cx="94095" cy="48930"/>
+          </a:xfrm>
+          <a:prstGeom prst="triangle">
+            <a:avLst/>
+          </a:prstGeom>
+          <a:solidFill>
+            <a:schemeClr val="bg1"/>
+          </a:solidFill>
+          <a:ln>
+            <a:solidFill>
+              <a:schemeClr val="bg1"/>
+            </a:solidFill>
+          </a:ln>
+        </p:spPr>
+        <p:style>
+          <a:lnRef idx="2">
+            <a:schemeClr val="accent1">
+              <a:shade val="50000"/>
+            </a:schemeClr>
+          </a:lnRef>
+          <a:fillRef idx="1">
+            <a:schemeClr val="accent1"/>
+          </a:fillRef>
+          <a:effectRef idx="0">
+            <a:schemeClr val="accent1"/>
+          </a:effectRef>
+          <a:fontRef idx="minor">
+            <a:schemeClr val="lt1"/>
+          </a:fontRef>
+        </p:style>
+        <p:txBody>
+          <a:bodyPr rot="0" spcFirstLastPara="0" vertOverflow="overflow" horzOverflow="overflow" vert="horz" wrap="square" lIns="91440" tIns="45721" rIns="91440" bIns="45721" numCol="1" spcCol="0" rtlCol="0" fromWordArt="0" anchor="ctr" anchorCtr="0" forceAA="0" compatLnSpc="1">
+            <a:prstTxWarp prst="textNoShape">
+              <a:avLst/>
+            </a:prstTxWarp>
+            <a:noAutofit/>
+          </a:bodyPr>
+          <a:lstStyle/>
+          <a:p>
+            <a:pPr algn="ctr"/>
+            <a:endParaRPr lang="en-GB" sz="1801"/>
+          </a:p>
+        </p:txBody>
+      </p:sp>
+      <p:sp>
+        <p:nvSpPr>
+          <p:cNvPr id="104" name="Isosceles Triangle 103"/>
+          <p:cNvSpPr/>
+          <p:nvPr/>
+        </p:nvSpPr>
+        <p:spPr>
+          <a:xfrm>
+            <a:off x="1175936" y="618465"/>
+            <a:ext cx="94095" cy="48930"/>
+          </a:xfrm>
+          <a:prstGeom prst="triangle">
+            <a:avLst/>
+          </a:prstGeom>
+          <a:solidFill>
+            <a:schemeClr val="bg1"/>
+          </a:solidFill>
+          <a:ln>
+            <a:solidFill>
+              <a:schemeClr val="bg1"/>
+            </a:solidFill>
+          </a:ln>
+        </p:spPr>
+        <p:style>
+          <a:lnRef idx="2">
+            <a:schemeClr val="accent1">
+              <a:shade val="50000"/>
+            </a:schemeClr>
+          </a:lnRef>
+          <a:fillRef idx="1">
+            <a:schemeClr val="accent1"/>
+          </a:fillRef>
+          <a:effectRef idx="0">
+            <a:schemeClr val="accent1"/>
+          </a:effectRef>
+          <a:fontRef idx="minor">
+            <a:schemeClr val="lt1"/>
+          </a:fontRef>
+        </p:style>
+        <p:txBody>
+          <a:bodyPr rot="0" spcFirstLastPara="0" vertOverflow="overflow" horzOverflow="overflow" vert="horz" wrap="square" lIns="91440" tIns="45721" rIns="91440" bIns="45721" numCol="1" spcCol="0" rtlCol="0" fromWordArt="0" anchor="ctr" anchorCtr="0" forceAA="0" compatLnSpc="1">
+            <a:prstTxWarp prst="textNoShape">
+              <a:avLst/>
+            </a:prstTxWarp>
+            <a:noAutofit/>
+          </a:bodyPr>
+          <a:lstStyle/>
+          <a:p>
+            <a:pPr algn="ctr"/>
+            <a:endParaRPr lang="en-GB" sz="1801"/>
+          </a:p>
+        </p:txBody>
+      </p:sp>
+      <p:sp>
+        <p:nvSpPr>
+          <p:cNvPr id="105" name="Isosceles Triangle 104"/>
+          <p:cNvSpPr/>
+          <p:nvPr/>
+        </p:nvSpPr>
+        <p:spPr>
+          <a:xfrm>
+            <a:off x="3117256" y="619930"/>
+            <a:ext cx="94095" cy="48930"/>
+          </a:xfrm>
+          <a:prstGeom prst="triangle">
+            <a:avLst/>
+          </a:prstGeom>
+          <a:solidFill>
+            <a:schemeClr val="bg1"/>
+          </a:solidFill>
+          <a:ln>
+            <a:solidFill>
+              <a:schemeClr val="bg1"/>
+            </a:solidFill>
+          </a:ln>
+        </p:spPr>
+        <p:style>
+          <a:lnRef idx="2">
+            <a:schemeClr val="accent1">
+              <a:shade val="50000"/>
+            </a:schemeClr>
+          </a:lnRef>
+          <a:fillRef idx="1">
+            <a:schemeClr val="accent1"/>
+          </a:fillRef>
+          <a:effectRef idx="0">
+            <a:schemeClr val="accent1"/>
+          </a:effectRef>
+          <a:fontRef idx="minor">
+            <a:schemeClr val="lt1"/>
+          </a:fontRef>
+        </p:style>
+        <p:txBody>
+          <a:bodyPr rot="0" spcFirstLastPara="0" vertOverflow="overflow" horzOverflow="overflow" vert="horz" wrap="square" lIns="91440" tIns="45721" rIns="91440" bIns="45721" numCol="1" spcCol="0" rtlCol="0" fromWordArt="0" anchor="ctr" anchorCtr="0" forceAA="0" compatLnSpc="1">
+            <a:prstTxWarp prst="textNoShape">
+              <a:avLst/>
+            </a:prstTxWarp>
+            <a:noAutofit/>
+          </a:bodyPr>
+          <a:lstStyle/>
+          <a:p>
+            <a:pPr algn="ctr"/>
+            <a:endParaRPr lang="en-GB" sz="1801">
+              <a:solidFill>
+                <a:schemeClr val="bg1"/>
+              </a:solidFill>
+            </a:endParaRPr>
+          </a:p>
+        </p:txBody>
+      </p:sp>
+      <p:sp>
+        <p:nvSpPr>
+          <p:cNvPr id="106" name="TextBox 105"/>
+          <p:cNvSpPr txBox="1"/>
+          <p:nvPr/>
+        </p:nvSpPr>
+        <p:spPr>
+          <a:xfrm>
+            <a:off x="700847" y="4533397"/>
+            <a:ext cx="479747" cy="307905"/>
+          </a:xfrm>
+          <a:prstGeom prst="rect">
+            <a:avLst/>
+          </a:prstGeom>
+          <a:noFill/>
+        </p:spPr>
+        <p:txBody>
+          <a:bodyPr wrap="none" rtlCol="0">
+            <a:spAutoFit/>
+          </a:bodyPr>
+          <a:lstStyle/>
+          <a:p>
+            <a:r>
+              <a:rPr lang="en-GB" sz="1401" b="1" dirty="0" smtClean="0">
+                <a:solidFill>
+                  <a:schemeClr val="bg1"/>
+                </a:solidFill>
+              </a:rPr>
+              <a:t>Test</a:t>
+            </a:r>
+            <a:endParaRPr lang="en-GB" sz="1600" b="1" dirty="0">
+              <a:solidFill>
+                <a:schemeClr val="bg1"/>
+              </a:solidFill>
+            </a:endParaRPr>
+          </a:p>
+        </p:txBody>
+      </p:sp>
+      <p:sp>
+        <p:nvSpPr>
+          <p:cNvPr id="107" name="Isosceles Triangle 106"/>
+          <p:cNvSpPr/>
+          <p:nvPr/>
+        </p:nvSpPr>
+        <p:spPr>
+          <a:xfrm flipV="1">
+            <a:off x="880880" y="4784903"/>
+            <a:ext cx="94095" cy="48930"/>
+          </a:xfrm>
+          <a:prstGeom prst="triangle">
+            <a:avLst/>
+          </a:prstGeom>
+          <a:solidFill>
+            <a:schemeClr val="bg1"/>
+          </a:solidFill>
+          <a:ln>
+            <a:noFill/>
+          </a:ln>
+        </p:spPr>
+        <p:style>
+          <a:lnRef idx="2">
+            <a:schemeClr val="accent1">
+              <a:shade val="50000"/>
+            </a:schemeClr>
+          </a:lnRef>
+          <a:fillRef idx="1">
+            <a:schemeClr val="accent1"/>
+          </a:fillRef>
+          <a:effectRef idx="0">
+            <a:schemeClr val="accent1"/>
+          </a:effectRef>
+          <a:fontRef idx="minor">
+            <a:schemeClr val="lt1"/>
+          </a:fontRef>
+        </p:style>
+        <p:txBody>
+          <a:bodyPr rot="0" spcFirstLastPara="0" vertOverflow="overflow" horzOverflow="overflow" vert="horz" wrap="square" lIns="91440" tIns="45721" rIns="91440" bIns="45721" numCol="1" spcCol="0" rtlCol="0" fromWordArt="0" anchor="ctr" anchorCtr="0" forceAA="0" compatLnSpc="1">
+            <a:prstTxWarp prst="textNoShape">
+              <a:avLst/>
+            </a:prstTxWarp>
+            <a:noAutofit/>
+          </a:bodyPr>
+          <a:lstStyle/>
+          <a:p>
+            <a:pPr algn="ctr"/>
+            <a:endParaRPr lang="en-GB" sz="1801"/>
+          </a:p>
+        </p:txBody>
+      </p:sp>
+      <p:sp>
+        <p:nvSpPr>
+          <p:cNvPr id="108" name="TextBox 107"/>
+          <p:cNvSpPr txBox="1"/>
+          <p:nvPr/>
+        </p:nvSpPr>
+        <p:spPr>
+          <a:xfrm>
+            <a:off x="681399" y="1565457"/>
+            <a:ext cx="1069139" cy="307905"/>
+          </a:xfrm>
+          <a:prstGeom prst="rect">
+            <a:avLst/>
+          </a:prstGeom>
+          <a:noFill/>
+        </p:spPr>
+        <p:txBody>
+          <a:bodyPr wrap="none" rtlCol="0">
+            <a:spAutoFit/>
+          </a:bodyPr>
+          <a:lstStyle/>
+          <a:p>
+            <a:r>
+              <a:rPr lang="en-GB" sz="1401" b="1" dirty="0">
+                <a:solidFill>
+                  <a:schemeClr val="bg1"/>
+                </a:solidFill>
+              </a:rPr>
+              <a:t>Instructions</a:t>
+            </a:r>
+            <a:endParaRPr lang="en-GB" sz="1600" b="1" dirty="0">
+              <a:solidFill>
+                <a:schemeClr val="bg1"/>
+              </a:solidFill>
+            </a:endParaRPr>
+          </a:p>
+        </p:txBody>
+      </p:sp>
+      <p:sp>
+        <p:nvSpPr>
+          <p:cNvPr id="109" name="Isosceles Triangle 108"/>
+          <p:cNvSpPr/>
+          <p:nvPr/>
+        </p:nvSpPr>
+        <p:spPr>
+          <a:xfrm flipV="1">
+            <a:off x="1400493" y="4784903"/>
+            <a:ext cx="94095" cy="48930"/>
+          </a:xfrm>
+          <a:prstGeom prst="triangle">
+            <a:avLst/>
+          </a:prstGeom>
+          <a:solidFill>
+            <a:schemeClr val="bg1"/>
+          </a:solidFill>
+          <a:ln>
+            <a:solidFill>
+              <a:schemeClr val="bg1"/>
+            </a:solidFill>
+          </a:ln>
+        </p:spPr>
+        <p:style>
+          <a:lnRef idx="2">
+            <a:schemeClr val="accent1">
+              <a:shade val="50000"/>
+            </a:schemeClr>
+          </a:lnRef>
+          <a:fillRef idx="1">
+            <a:schemeClr val="accent1"/>
+          </a:fillRef>
+          <a:effectRef idx="0">
+            <a:schemeClr val="accent1"/>
+          </a:effectRef>
+          <a:fontRef idx="minor">
+            <a:schemeClr val="lt1"/>
+          </a:fontRef>
+        </p:style>
+        <p:txBody>
+          <a:bodyPr rot="0" spcFirstLastPara="0" vertOverflow="overflow" horzOverflow="overflow" vert="horz" wrap="square" lIns="91440" tIns="45721" rIns="91440" bIns="45721" numCol="1" spcCol="0" rtlCol="0" fromWordArt="0" anchor="ctr" anchorCtr="0" forceAA="0" compatLnSpc="1">
+            <a:prstTxWarp prst="textNoShape">
+              <a:avLst/>
+            </a:prstTxWarp>
+            <a:noAutofit/>
+          </a:bodyPr>
+          <a:lstStyle/>
+          <a:p>
+            <a:pPr algn="ctr"/>
+            <a:endParaRPr lang="en-GB" sz="1801"/>
+          </a:p>
+        </p:txBody>
+      </p:sp>
+      <p:sp>
+        <p:nvSpPr>
+          <p:cNvPr id="110" name="TextBox 109"/>
+          <p:cNvSpPr txBox="1"/>
+          <p:nvPr/>
+        </p:nvSpPr>
+        <p:spPr>
+          <a:xfrm>
+            <a:off x="1144535" y="4529087"/>
+            <a:ext cx="647741" cy="307905"/>
+          </a:xfrm>
+          <a:prstGeom prst="rect">
+            <a:avLst/>
+          </a:prstGeom>
+          <a:noFill/>
+        </p:spPr>
+        <p:txBody>
+          <a:bodyPr wrap="none" rtlCol="0">
+            <a:spAutoFit/>
+          </a:bodyPr>
+          <a:lstStyle/>
+          <a:p>
+            <a:r>
+              <a:rPr lang="en-GB" sz="1401" b="1" dirty="0" smtClean="0">
+                <a:solidFill>
+                  <a:schemeClr val="bg1"/>
+                </a:solidFill>
+              </a:rPr>
+              <a:t>Status</a:t>
+            </a:r>
+            <a:endParaRPr lang="en-GB" sz="1600" b="1" dirty="0">
+              <a:solidFill>
+                <a:schemeClr val="bg1"/>
+              </a:solidFill>
+            </a:endParaRPr>
+          </a:p>
+        </p:txBody>
+      </p:sp>
+      <p:sp>
+        <p:nvSpPr>
           <p:cNvPr id="79" name="Rectangle 78"/>
           <p:cNvSpPr/>
           <p:nvPr/>
         </p:nvSpPr>
         <p:spPr>
           <a:xfrm>
-            <a:off x="1089659" y="1066685"/>
-            <a:ext cx="3361900" cy="338554"/>
+            <a:off x="1229210" y="1060054"/>
+            <a:ext cx="2152524" cy="307777"/>
           </a:xfrm>
           <a:prstGeom prst="rect">
             <a:avLst/>
@@ -4395,7 +4609,11 @@
           <a:lstStyle/>
           <a:p>
             <a:r>
-              <a:rPr lang="en-GB" sz="1600" b="1" dirty="0"/>
+              <a:rPr lang="en-GB" sz="1400" dirty="0">
+                <a:latin typeface="Segoe UI" panose="020B0502040204020203" pitchFamily="34" charset="0"/>
+                <a:ea typeface="Segoe UI" panose="020B0502040204020203" pitchFamily="34" charset="0"/>
+                <a:cs typeface="Segoe UI" panose="020B0502040204020203" pitchFamily="34" charset="0"/>
+              </a:rPr>
               <a:t>VALVE PACK PCB TESTER</a:t>
             </a:r>
           </a:p>
@@ -4676,7 +4894,7 @@
   <a:extraClrSchemeLst/>
   <a:extLst>
     <a:ext uri="{05A4C25C-085E-4340-85A3-A5531E510DB2}">
-      <thm15:themeFamily xmlns:thm15="http://schemas.microsoft.com/office/thememl/2012/main" name="Office Theme" id="{62F939B6-93AF-4DB8-9C6B-D6C7DFDC589F}" vid="{4A3C46E8-61CC-4603-A589-7422A47A8E4A}"/>
+      <thm15:themeFamily xmlns:thm15="http://schemas.microsoft.com/office/thememl/2012/main" xmlns="" name="Office Theme" id="{62F939B6-93AF-4DB8-9C6B-D6C7DFDC589F}" vid="{4A3C46E8-61CC-4603-A589-7422A47A8E4A}"/>
     </a:ext>
   </a:extLst>
 </a:theme>

</xml_diff>